<commit_message>
figure sense actuate changed
</commit_message>
<xml_diff>
--- a/RTSS15/Paper/RTSS15_Paper/figures/senseActuate.pptx
+++ b/RTSS15/Paper/RTSS15_Paper/figures/senseActuate.pptx
@@ -289,7 +289,7 @@
           <a:p>
             <a:fld id="{6438B9B7-B47A-9D4E-9850-8371A0E3764C}" type="datetimeFigureOut">
               <a:rPr lang="en-US" smtClean="0"/>
-              <a:t>5/15/2015</a:t>
+              <a:t>5/16/2015</a:t>
             </a:fld>
             <a:endParaRPr lang="en-US"/>
           </a:p>
@@ -459,7 +459,7 @@
           <a:p>
             <a:fld id="{6438B9B7-B47A-9D4E-9850-8371A0E3764C}" type="datetimeFigureOut">
               <a:rPr lang="en-US" smtClean="0"/>
-              <a:t>5/15/2015</a:t>
+              <a:t>5/16/2015</a:t>
             </a:fld>
             <a:endParaRPr lang="en-US"/>
           </a:p>
@@ -639,7 +639,7 @@
           <a:p>
             <a:fld id="{6438B9B7-B47A-9D4E-9850-8371A0E3764C}" type="datetimeFigureOut">
               <a:rPr lang="en-US" smtClean="0"/>
-              <a:t>5/15/2015</a:t>
+              <a:t>5/16/2015</a:t>
             </a:fld>
             <a:endParaRPr lang="en-US"/>
           </a:p>
@@ -809,7 +809,7 @@
           <a:p>
             <a:fld id="{6438B9B7-B47A-9D4E-9850-8371A0E3764C}" type="datetimeFigureOut">
               <a:rPr lang="en-US" smtClean="0"/>
-              <a:t>5/15/2015</a:t>
+              <a:t>5/16/2015</a:t>
             </a:fld>
             <a:endParaRPr lang="en-US"/>
           </a:p>
@@ -1055,7 +1055,7 @@
           <a:p>
             <a:fld id="{6438B9B7-B47A-9D4E-9850-8371A0E3764C}" type="datetimeFigureOut">
               <a:rPr lang="en-US" smtClean="0"/>
-              <a:t>5/15/2015</a:t>
+              <a:t>5/16/2015</a:t>
             </a:fld>
             <a:endParaRPr lang="en-US"/>
           </a:p>
@@ -1343,7 +1343,7 @@
           <a:p>
             <a:fld id="{6438B9B7-B47A-9D4E-9850-8371A0E3764C}" type="datetimeFigureOut">
               <a:rPr lang="en-US" smtClean="0"/>
-              <a:t>5/15/2015</a:t>
+              <a:t>5/16/2015</a:t>
             </a:fld>
             <a:endParaRPr lang="en-US"/>
           </a:p>
@@ -1765,7 +1765,7 @@
           <a:p>
             <a:fld id="{6438B9B7-B47A-9D4E-9850-8371A0E3764C}" type="datetimeFigureOut">
               <a:rPr lang="en-US" smtClean="0"/>
-              <a:t>5/15/2015</a:t>
+              <a:t>5/16/2015</a:t>
             </a:fld>
             <a:endParaRPr lang="en-US"/>
           </a:p>
@@ -1883,7 +1883,7 @@
           <a:p>
             <a:fld id="{6438B9B7-B47A-9D4E-9850-8371A0E3764C}" type="datetimeFigureOut">
               <a:rPr lang="en-US" smtClean="0"/>
-              <a:t>5/15/2015</a:t>
+              <a:t>5/16/2015</a:t>
             </a:fld>
             <a:endParaRPr lang="en-US"/>
           </a:p>
@@ -1978,7 +1978,7 @@
           <a:p>
             <a:fld id="{6438B9B7-B47A-9D4E-9850-8371A0E3764C}" type="datetimeFigureOut">
               <a:rPr lang="en-US" smtClean="0"/>
-              <a:t>5/15/2015</a:t>
+              <a:t>5/16/2015</a:t>
             </a:fld>
             <a:endParaRPr lang="en-US"/>
           </a:p>
@@ -2255,7 +2255,7 @@
           <a:p>
             <a:fld id="{6438B9B7-B47A-9D4E-9850-8371A0E3764C}" type="datetimeFigureOut">
               <a:rPr lang="en-US" smtClean="0"/>
-              <a:t>5/15/2015</a:t>
+              <a:t>5/16/2015</a:t>
             </a:fld>
             <a:endParaRPr lang="en-US"/>
           </a:p>
@@ -2508,7 +2508,7 @@
           <a:p>
             <a:fld id="{6438B9B7-B47A-9D4E-9850-8371A0E3764C}" type="datetimeFigureOut">
               <a:rPr lang="en-US" smtClean="0"/>
-              <a:t>5/15/2015</a:t>
+              <a:t>5/16/2015</a:t>
             </a:fld>
             <a:endParaRPr lang="en-US"/>
           </a:p>
@@ -2721,7 +2721,7 @@
           <a:p>
             <a:fld id="{6438B9B7-B47A-9D4E-9850-8371A0E3764C}" type="datetimeFigureOut">
               <a:rPr lang="en-US" smtClean="0"/>
-              <a:t>5/15/2015</a:t>
+              <a:t>5/16/2015</a:t>
             </a:fld>
             <a:endParaRPr lang="en-US"/>
           </a:p>
@@ -3586,7 +3586,7 @@
         </p:nvSpPr>
         <p:spPr>
           <a:xfrm>
-            <a:off x="6327555" y="3804134"/>
+            <a:off x="6327555" y="3749704"/>
             <a:ext cx="1332821" cy="461665"/>
           </a:xfrm>
           <a:prstGeom prst="rect">
@@ -3676,7 +3676,7 @@
         </p:nvSpPr>
         <p:spPr>
           <a:xfrm>
-            <a:off x="5031992" y="3808165"/>
+            <a:off x="5031992" y="3764621"/>
             <a:ext cx="1332821" cy="461665"/>
           </a:xfrm>
           <a:prstGeom prst="rect">
@@ -3707,7 +3707,7 @@
         <p:spPr>
           <a:xfrm>
             <a:off x="988776" y="5300684"/>
-            <a:ext cx="666410" cy="461665"/>
+            <a:ext cx="666410" cy="584775"/>
           </a:xfrm>
           <a:prstGeom prst="rect">
             <a:avLst/>
@@ -3721,14 +3721,14 @@
           <a:lstStyle/>
           <a:p>
             <a:r>
-              <a:rPr lang="en-US" sz="2400" dirty="0" err="1" smtClean="0"/>
+              <a:rPr lang="en-US" sz="3200" dirty="0" err="1" smtClean="0"/>
               <a:t>t</a:t>
             </a:r>
             <a:r>
-              <a:rPr lang="en-US" sz="2400" baseline="-25000" dirty="0" err="1" smtClean="0"/>
-              <a:t>k</a:t>
-            </a:r>
-            <a:endParaRPr lang="en-US" baseline="-25000" dirty="0"/>
+              <a:rPr lang="en-US" sz="3200" baseline="-25000" dirty="0" err="1" smtClean="0"/>
+              <a:t>s,k</a:t>
+            </a:r>
+            <a:endParaRPr lang="en-US" sz="2400" baseline="-25000" dirty="0"/>
           </a:p>
         </p:txBody>
       </p:sp>
@@ -3740,8 +3740,8 @@
         </p:nvSpPr>
         <p:spPr>
           <a:xfrm>
-            <a:off x="3641657" y="5292954"/>
-            <a:ext cx="1242793" cy="461665"/>
+            <a:off x="3717859" y="5282068"/>
+            <a:ext cx="1242793" cy="584775"/>
           </a:xfrm>
           <a:prstGeom prst="rect">
             <a:avLst/>
@@ -3755,14 +3755,14 @@
           <a:lstStyle/>
           <a:p>
             <a:r>
-              <a:rPr lang="en-US" sz="2400" dirty="0" smtClean="0"/>
+              <a:rPr lang="en-US" sz="3200" dirty="0"/>
               <a:t>t</a:t>
             </a:r>
             <a:r>
-              <a:rPr lang="en-US" sz="2400" baseline="-25000" dirty="0" smtClean="0"/>
-              <a:t>k+1</a:t>
-            </a:r>
-            <a:endParaRPr lang="en-US" sz="2400" baseline="-25000" dirty="0"/>
+              <a:rPr lang="en-US" sz="3200" baseline="-25000" dirty="0" smtClean="0"/>
+              <a:t>s,k+1</a:t>
+            </a:r>
+            <a:endParaRPr lang="en-US" sz="3200" baseline="-25000" dirty="0"/>
           </a:p>
         </p:txBody>
       </p:sp>
@@ -3808,8 +3808,8 @@
         </p:nvSpPr>
         <p:spPr>
           <a:xfrm>
-            <a:off x="2278053" y="5311565"/>
-            <a:ext cx="1719584" cy="461665"/>
+            <a:off x="2092991" y="5278907"/>
+            <a:ext cx="1719584" cy="584775"/>
           </a:xfrm>
           <a:prstGeom prst="rect">
             <a:avLst/>
@@ -3823,38 +3823,38 @@
           <a:lstStyle/>
           <a:p>
             <a:r>
-              <a:rPr lang="en-US" sz="2400" dirty="0" err="1" smtClean="0"/>
+              <a:rPr lang="en-US" sz="3200" dirty="0" err="1"/>
               <a:t>t</a:t>
             </a:r>
             <a:r>
-              <a:rPr lang="en-US" sz="2400" baseline="-25000" dirty="0" err="1" smtClean="0"/>
+              <a:rPr lang="en-US" sz="3200" baseline="-25000" dirty="0" err="1" smtClean="0"/>
+              <a:t>s,k</a:t>
+            </a:r>
+            <a:r>
+              <a:rPr lang="en-US" sz="3200" dirty="0" smtClean="0"/>
+              <a:t>+</a:t>
+            </a:r>
+            <a:r>
+              <a:rPr lang="el-GR" sz="3200" dirty="0" smtClean="0"/>
+              <a:t>δ</a:t>
+            </a:r>
+            <a:r>
+              <a:rPr lang="en-US" sz="3200" baseline="-25000" dirty="0" smtClean="0"/>
               <a:t>k</a:t>
             </a:r>
             <a:r>
-              <a:rPr lang="en-US" sz="2400" dirty="0" smtClean="0"/>
+              <a:rPr lang="en-US" sz="3200" dirty="0" smtClean="0"/>
               <a:t>+</a:t>
             </a:r>
             <a:r>
-              <a:rPr lang="el-GR" sz="2400" dirty="0" smtClean="0"/>
-              <a:t>δ</a:t>
-            </a:r>
-            <a:r>
-              <a:rPr lang="en-US" sz="2400" baseline="-25000" dirty="0" smtClean="0"/>
+              <a:rPr lang="el-GR" sz="3200" dirty="0" smtClean="0"/>
+              <a:t>τ</a:t>
+            </a:r>
+            <a:r>
+              <a:rPr lang="en-US" sz="3200" baseline="-25000" dirty="0" smtClean="0"/>
               <a:t>k</a:t>
             </a:r>
-            <a:r>
-              <a:rPr lang="en-US" sz="2400" dirty="0" smtClean="0"/>
-              <a:t>+</a:t>
-            </a:r>
-            <a:r>
-              <a:rPr lang="el-GR" sz="2400" dirty="0" smtClean="0"/>
-              <a:t>τ</a:t>
-            </a:r>
-            <a:r>
-              <a:rPr lang="en-US" sz="2400" baseline="-25000" dirty="0" smtClean="0"/>
-              <a:t>k</a:t>
-            </a:r>
-            <a:endParaRPr lang="en-US" sz="2400" baseline="-25000" dirty="0"/>
+            <a:endParaRPr lang="en-US" sz="3200" baseline="-25000" dirty="0"/>
           </a:p>
         </p:txBody>
       </p:sp>
@@ -3867,7 +3867,7 @@
         <p:spPr>
           <a:xfrm>
             <a:off x="5053764" y="5304603"/>
-            <a:ext cx="3105401" cy="461665"/>
+            <a:ext cx="3105401" cy="584775"/>
           </a:xfrm>
           <a:prstGeom prst="rect">
             <a:avLst/>
@@ -3881,38 +3881,38 @@
           <a:lstStyle/>
           <a:p>
             <a:r>
-              <a:rPr lang="en-US" sz="2400" dirty="0" smtClean="0"/>
+              <a:rPr lang="en-US" sz="3200" dirty="0" smtClean="0"/>
               <a:t>t</a:t>
             </a:r>
             <a:r>
-              <a:rPr lang="en-US" sz="2400" baseline="-25000" dirty="0" smtClean="0"/>
+              <a:rPr lang="en-US" sz="3200" baseline="-25000" dirty="0" smtClean="0"/>
+              <a:t>s,k+1</a:t>
+            </a:r>
+            <a:r>
+              <a:rPr lang="en-US" sz="3200" dirty="0" smtClean="0"/>
+              <a:t>+</a:t>
+            </a:r>
+            <a:r>
+              <a:rPr lang="el-GR" sz="3200" dirty="0" smtClean="0"/>
+              <a:t>δ</a:t>
+            </a:r>
+            <a:r>
+              <a:rPr lang="en-US" sz="3200" baseline="-25000" dirty="0" smtClean="0"/>
               <a:t>k+1</a:t>
             </a:r>
             <a:r>
-              <a:rPr lang="en-US" sz="2400" dirty="0" smtClean="0"/>
+              <a:rPr lang="en-US" sz="3200" dirty="0" smtClean="0"/>
               <a:t>+</a:t>
             </a:r>
             <a:r>
-              <a:rPr lang="el-GR" sz="2400" dirty="0" smtClean="0"/>
-              <a:t>δ</a:t>
-            </a:r>
-            <a:r>
-              <a:rPr lang="en-US" sz="2400" baseline="-25000" dirty="0" smtClean="0"/>
+              <a:rPr lang="el-GR" sz="3200" dirty="0" smtClean="0"/>
+              <a:t>τ</a:t>
+            </a:r>
+            <a:r>
+              <a:rPr lang="en-US" sz="3200" baseline="-25000" dirty="0" smtClean="0"/>
               <a:t>k+1</a:t>
             </a:r>
-            <a:r>
-              <a:rPr lang="en-US" sz="2400" dirty="0" smtClean="0"/>
-              <a:t>+</a:t>
-            </a:r>
-            <a:r>
-              <a:rPr lang="el-GR" sz="2400" dirty="0" smtClean="0"/>
-              <a:t>τ</a:t>
-            </a:r>
-            <a:r>
-              <a:rPr lang="en-US" sz="2400" baseline="-25000" dirty="0" smtClean="0"/>
-              <a:t>k+1</a:t>
-            </a:r>
-            <a:endParaRPr lang="en-US" sz="2400" baseline="-25000" dirty="0"/>
+            <a:endParaRPr lang="en-US" sz="3200" baseline="-25000" dirty="0"/>
           </a:p>
         </p:txBody>
       </p:sp>

</xml_diff>